<commit_message>
init FE Project with Query For User Posts
</commit_message>
<xml_diff>
--- a/Sure_Ahmed_Samir_GQL_Tut.pptx
+++ b/Sure_Ahmed_Samir_GQL_Tut.pptx
@@ -5,7 +5,7 @@
     <p:sldMasterId id="2147483648" r:id="rId1"/>
   </p:sldMasterIdLst>
   <p:notesMasterIdLst>
-    <p:notesMasterId r:id="rId25"/>
+    <p:notesMasterId r:id="rId26"/>
   </p:notesMasterIdLst>
   <p:sldIdLst>
     <p:sldId id="256" r:id="rId2"/>
@@ -30,7 +30,8 @@
     <p:sldId id="275" r:id="rId21"/>
     <p:sldId id="277" r:id="rId22"/>
     <p:sldId id="278" r:id="rId23"/>
-    <p:sldId id="276" r:id="rId24"/>
+    <p:sldId id="279" r:id="rId24"/>
+    <p:sldId id="276" r:id="rId25"/>
   </p:sldIdLst>
   <p:sldSz cx="12192000" cy="6858000"/>
   <p:notesSz cx="6858000" cy="9144000"/>
@@ -4779,15 +4780,7 @@
           <a:p>
             <a:r>
               <a:rPr lang="en-US" dirty="0" smtClean="0"/>
-              <a:t>Resolvers  </a:t>
-            </a:r>
-            <a:r>
-              <a:rPr lang="en-US" dirty="0" smtClean="0"/>
-              <a:t>and data loaders </a:t>
-            </a:r>
-            <a:r>
-              <a:rPr lang="en-US" dirty="0" smtClean="0"/>
-              <a:t>:</a:t>
+              <a:t>Resolvers  and data loaders :</a:t>
             </a:r>
           </a:p>
           <a:p>
@@ -8813,11 +8806,7 @@
           <a:p>
             <a:r>
               <a:rPr lang="en-US" dirty="0" smtClean="0"/>
-              <a:t>The Power Of Resolvers </a:t>
-            </a:r>
-            <a:r>
-              <a:rPr lang="en-US" dirty="0" smtClean="0"/>
-              <a:t>and </a:t>
+              <a:t>The Power Of Resolvers and </a:t>
             </a:r>
             <a:r>
               <a:rPr lang="en-US" dirty="0" err="1" smtClean="0"/>
@@ -8854,22 +8843,12 @@
               <a:rPr lang="en-US" dirty="0" smtClean="0"/>
               <a:t>Model with custom Field resolver Nationality.</a:t>
             </a:r>
-            <a:endParaRPr lang="en-US" dirty="0" smtClean="0"/>
           </a:p>
           <a:p>
             <a:r>
               <a:rPr lang="en-US" dirty="0" smtClean="0"/>
-              <a:t>Modifying </a:t>
-            </a:r>
-            <a:r>
-              <a:rPr lang="en-US" dirty="0" smtClean="0"/>
-              <a:t>the User Model With Data From external source </a:t>
-            </a:r>
-            <a:r>
-              <a:rPr lang="en-US" dirty="0" smtClean="0"/>
-              <a:t>Weather </a:t>
-            </a:r>
-            <a:endParaRPr lang="en-US" dirty="0" smtClean="0"/>
+              <a:t>Modifying the User Model With Data From external source Weather </a:t>
+            </a:r>
           </a:p>
           <a:p>
             <a:r>
@@ -8882,19 +8861,7 @@
             </a:r>
             <a:r>
               <a:rPr lang="en-US" dirty="0" smtClean="0"/>
-              <a:t> project as </a:t>
-            </a:r>
-            <a:r>
-              <a:rPr lang="en-US" dirty="0" smtClean="0"/>
-              <a:t>microservice simulation </a:t>
-            </a:r>
-            <a:r>
-              <a:rPr lang="en-US" dirty="0" smtClean="0"/>
-              <a:t>example </a:t>
-            </a:r>
-            <a:r>
-              <a:rPr lang="en-US" dirty="0" smtClean="0"/>
-              <a:t>,</a:t>
+              <a:t> project as microservice simulation example ,</a:t>
             </a:r>
           </a:p>
           <a:p>
@@ -8922,7 +8889,6 @@
               <a:rPr lang="en-US" dirty="0" smtClean="0"/>
               <a:t> not in GQL Cloud we can mark a property directly as @Lambda to fetch a property directly from API .</a:t>
             </a:r>
-            <a:endParaRPr lang="en-US" dirty="0" smtClean="0"/>
           </a:p>
           <a:p>
             <a:endParaRPr lang="en-US" dirty="0"/>
@@ -9010,9 +8976,85 @@
         </p:nvSpPr>
         <p:spPr/>
         <p:txBody>
-          <a:bodyPr/>
+          <a:bodyPr>
+            <a:normAutofit fontScale="77500" lnSpcReduction="20000"/>
+          </a:bodyPr>
           <a:lstStyle/>
           <a:p>
+            <a:r>
+              <a:rPr lang="en-US" dirty="0"/>
+              <a:t>S</a:t>
+            </a:r>
+            <a:r>
+              <a:rPr lang="en-US" dirty="0" smtClean="0"/>
+              <a:t>ubscriptions </a:t>
+            </a:r>
+            <a:r>
+              <a:rPr lang="en-US" dirty="0"/>
+              <a:t>are long-lasting operations that can change their result over time. They can maintain an active connection to your </a:t>
+            </a:r>
+            <a:r>
+              <a:rPr lang="en-US" dirty="0" err="1"/>
+              <a:t>GraphQL</a:t>
+            </a:r>
+            <a:r>
+              <a:rPr lang="en-US" dirty="0"/>
+              <a:t> server (most commonly via </a:t>
+            </a:r>
+            <a:r>
+              <a:rPr lang="en-US" dirty="0" err="1"/>
+              <a:t>WebSocket</a:t>
+            </a:r>
+            <a:r>
+              <a:rPr lang="en-US" dirty="0"/>
+              <a:t>), enabling the server to push updates to the subscription's result.</a:t>
+            </a:r>
+          </a:p>
+          <a:p>
+            <a:r>
+              <a:rPr lang="en-US" dirty="0"/>
+              <a:t>Subscriptions are useful for notifying your client in real time about changes to back-end data, such as the creation of a new object or updates to an important field.</a:t>
+            </a:r>
+          </a:p>
+          <a:p>
+            <a:r>
+              <a:rPr lang="en-US" b="1" dirty="0">
+                <a:hlinkClick r:id="rId2"/>
+              </a:rPr>
+              <a:t>When to use subscriptions</a:t>
+            </a:r>
+            <a:endParaRPr lang="en-US" b="1" dirty="0"/>
+          </a:p>
+          <a:p>
+            <a:r>
+              <a:rPr lang="en-US" b="1" dirty="0"/>
+              <a:t>Small, incremental changes to large objects</a:t>
+            </a:r>
+            <a:r>
+              <a:rPr lang="en-US" dirty="0"/>
+              <a:t>. Repeatedly polling for a large object is expensive, especially when most of the object's fields rarely change. Instead, you can fetch the object's initial state with a query, and your server can proactively push updates to individual fields as they occur.</a:t>
+            </a:r>
+          </a:p>
+          <a:p>
+            <a:r>
+              <a:rPr lang="en-US" b="1" dirty="0"/>
+              <a:t>Low-latency, real-time updates</a:t>
+            </a:r>
+            <a:r>
+              <a:rPr lang="en-US" dirty="0"/>
+              <a:t>. For example, a chat application's client wants to receive new messages as soon as they're available.</a:t>
+            </a:r>
+          </a:p>
+          <a:p>
+            <a:r>
+              <a:rPr lang="en-US" dirty="0" smtClean="0"/>
+              <a:t>And the alternative is Pooling Technique by WatchQuery or Query with pollInterval ** we be discussed later .</a:t>
+            </a:r>
+          </a:p>
+          <a:p>
+            <a:pPr marL="0" indent="0">
+              <a:buNone/>
+            </a:pPr>
             <a:endParaRPr lang="en-US" dirty="0"/>
           </a:p>
         </p:txBody>
@@ -9031,6 +9073,168 @@
 </file>
 
 <file path=ppt/slides/slide23.xml><?xml version="1.0" encoding="utf-8"?>
+<p:sld xmlns:a="http://schemas.openxmlformats.org/drawingml/2006/main" xmlns:r="http://schemas.openxmlformats.org/officeDocument/2006/relationships" xmlns:p="http://schemas.openxmlformats.org/presentationml/2006/main">
+  <p:cSld>
+    <p:spTree>
+      <p:nvGrpSpPr>
+        <p:cNvPr id="1" name=""/>
+        <p:cNvGrpSpPr/>
+        <p:nvPr/>
+      </p:nvGrpSpPr>
+      <p:grpSpPr>
+        <a:xfrm>
+          <a:off x="0" y="0"/>
+          <a:ext cx="0" cy="0"/>
+          <a:chOff x="0" y="0"/>
+          <a:chExt cx="0" cy="0"/>
+        </a:xfrm>
+      </p:grpSpPr>
+      <p:sp>
+        <p:nvSpPr>
+          <p:cNvPr id="2" name="Title 1"/>
+          <p:cNvSpPr>
+            <a:spLocks noGrp="1"/>
+          </p:cNvSpPr>
+          <p:nvPr>
+            <p:ph type="title"/>
+          </p:nvPr>
+        </p:nvSpPr>
+        <p:spPr/>
+        <p:txBody>
+          <a:bodyPr/>
+          <a:lstStyle/>
+          <a:p>
+            <a:r>
+              <a:rPr lang="en-US" dirty="0" smtClean="0"/>
+              <a:t>Clients : Time For Client side </a:t>
+            </a:r>
+            <a:r>
+              <a:rPr lang="en-US" dirty="0" err="1" smtClean="0"/>
+              <a:t>cunsumers</a:t>
+            </a:r>
+            <a:r>
+              <a:rPr lang="en-US" dirty="0" smtClean="0"/>
+              <a:t> and some play * Apollo </a:t>
+            </a:r>
+            <a:endParaRPr lang="en-US" dirty="0"/>
+          </a:p>
+        </p:txBody>
+      </p:sp>
+      <p:sp>
+        <p:nvSpPr>
+          <p:cNvPr id="3" name="Content Placeholder 2"/>
+          <p:cNvSpPr>
+            <a:spLocks noGrp="1"/>
+          </p:cNvSpPr>
+          <p:nvPr>
+            <p:ph idx="1"/>
+          </p:nvPr>
+        </p:nvSpPr>
+        <p:spPr/>
+        <p:txBody>
+          <a:bodyPr/>
+          <a:lstStyle/>
+          <a:p>
+            <a:r>
+              <a:rPr lang="en-US" dirty="0" err="1" smtClean="0"/>
+              <a:t>Apllo</a:t>
+            </a:r>
+            <a:r>
+              <a:rPr lang="en-US" dirty="0" smtClean="0"/>
+              <a:t> is one of the most </a:t>
+            </a:r>
+            <a:r>
+              <a:rPr lang="en-US" dirty="0" err="1" smtClean="0"/>
+              <a:t>famos</a:t>
+            </a:r>
+            <a:r>
+              <a:rPr lang="en-US" dirty="0" smtClean="0"/>
+              <a:t> GQL Libraries for client and server side </a:t>
+            </a:r>
+          </a:p>
+          <a:p>
+            <a:r>
+              <a:rPr lang="en-US" dirty="0" smtClean="0"/>
+              <a:t>It’s very common use in Client sides and available for angular , react , </a:t>
+            </a:r>
+            <a:r>
+              <a:rPr lang="en-US" dirty="0" err="1" smtClean="0"/>
+              <a:t>veuJS</a:t>
+            </a:r>
+            <a:r>
+              <a:rPr lang="en-US" dirty="0" smtClean="0"/>
+              <a:t> , </a:t>
+            </a:r>
+            <a:r>
+              <a:rPr lang="en-US" dirty="0" err="1" smtClean="0"/>
+              <a:t>pureJs</a:t>
+            </a:r>
+            <a:r>
+              <a:rPr lang="en-US" dirty="0" smtClean="0"/>
+              <a:t> , </a:t>
+            </a:r>
+            <a:r>
+              <a:rPr lang="en-US" dirty="0" err="1" smtClean="0"/>
+              <a:t>kotlin</a:t>
+            </a:r>
+            <a:r>
+              <a:rPr lang="en-US" dirty="0" smtClean="0"/>
+              <a:t> and swift .</a:t>
+            </a:r>
+          </a:p>
+          <a:p>
+            <a:r>
+              <a:rPr lang="en-US" dirty="0">
+                <a:hlinkClick r:id="rId2"/>
+              </a:rPr>
+              <a:t>https://www.apollographql.com/docs</a:t>
+            </a:r>
+            <a:r>
+              <a:rPr lang="en-US" dirty="0" smtClean="0">
+                <a:hlinkClick r:id="rId2"/>
+              </a:rPr>
+              <a:t>/</a:t>
+            </a:r>
+            <a:endParaRPr lang="en-US" dirty="0" smtClean="0"/>
+          </a:p>
+          <a:p>
+            <a:r>
+              <a:rPr lang="en-US" dirty="0">
+                <a:hlinkClick r:id="rId3"/>
+              </a:rPr>
+              <a:t>https://apollo-angular.com/docs</a:t>
+            </a:r>
+            <a:r>
+              <a:rPr lang="en-US" dirty="0" smtClean="0">
+                <a:hlinkClick r:id="rId3"/>
+              </a:rPr>
+              <a:t>/</a:t>
+            </a:r>
+            <a:endParaRPr lang="en-US" dirty="0" smtClean="0"/>
+          </a:p>
+          <a:p>
+            <a:r>
+              <a:rPr lang="en-US" dirty="0" smtClean="0"/>
+              <a:t>Lets start our FE project </a:t>
+            </a:r>
+            <a:endParaRPr lang="en-US" dirty="0"/>
+          </a:p>
+        </p:txBody>
+      </p:sp>
+    </p:spTree>
+    <p:extLst>
+      <p:ext uri="{BB962C8B-B14F-4D97-AF65-F5344CB8AC3E}">
+        <p14:creationId xmlns:p14="http://schemas.microsoft.com/office/powerpoint/2010/main" val="3234917675"/>
+      </p:ext>
+    </p:extLst>
+  </p:cSld>
+  <p:clrMapOvr>
+    <a:masterClrMapping/>
+  </p:clrMapOvr>
+</p:sld>
+</file>
+
+<file path=ppt/slides/slide24.xml><?xml version="1.0" encoding="utf-8"?>
 <p:sld xmlns:a="http://schemas.openxmlformats.org/drawingml/2006/main" xmlns:r="http://schemas.openxmlformats.org/officeDocument/2006/relationships" xmlns:p="http://schemas.openxmlformats.org/presentationml/2006/main">
   <p:cSld>
     <p:spTree>

</xml_diff>

<commit_message>
adding git hub link
</commit_message>
<xml_diff>
--- a/Sure_Ahmed_Samir_GQL_Tut.pptx
+++ b/Sure_Ahmed_Samir_GQL_Tut.pptx
@@ -220,7 +220,7 @@
           <a:p>
             <a:fld id="{40E5F44E-6249-4E81-AC40-347B8931640D}" type="datetimeFigureOut">
               <a:rPr lang="en-US" smtClean="0"/>
-              <a:t>7/20/2022</a:t>
+              <a:t>7/21/2022</a:t>
             </a:fld>
             <a:endParaRPr lang="en-US"/>
           </a:p>
@@ -703,7 +703,7 @@
           <a:p>
             <a:fld id="{208FA2B7-0B11-4137-BC5E-6BB985399255}" type="datetimeFigureOut">
               <a:rPr lang="en-US" smtClean="0"/>
-              <a:t>7/20/2022</a:t>
+              <a:t>7/21/2022</a:t>
             </a:fld>
             <a:endParaRPr lang="en-US"/>
           </a:p>
@@ -873,7 +873,7 @@
           <a:p>
             <a:fld id="{208FA2B7-0B11-4137-BC5E-6BB985399255}" type="datetimeFigureOut">
               <a:rPr lang="en-US" smtClean="0"/>
-              <a:t>7/20/2022</a:t>
+              <a:t>7/21/2022</a:t>
             </a:fld>
             <a:endParaRPr lang="en-US"/>
           </a:p>
@@ -1053,7 +1053,7 @@
           <a:p>
             <a:fld id="{208FA2B7-0B11-4137-BC5E-6BB985399255}" type="datetimeFigureOut">
               <a:rPr lang="en-US" smtClean="0"/>
-              <a:t>7/20/2022</a:t>
+              <a:t>7/21/2022</a:t>
             </a:fld>
             <a:endParaRPr lang="en-US"/>
           </a:p>
@@ -1253,7 +1253,7 @@
           <a:p>
             <a:fld id="{208FA2B7-0B11-4137-BC5E-6BB985399255}" type="datetimeFigureOut">
               <a:rPr lang="en-US" smtClean="0"/>
-              <a:t>7/20/2022</a:t>
+              <a:t>7/21/2022</a:t>
             </a:fld>
             <a:endParaRPr lang="en-US"/>
           </a:p>
@@ -1499,7 +1499,7 @@
           <a:p>
             <a:fld id="{208FA2B7-0B11-4137-BC5E-6BB985399255}" type="datetimeFigureOut">
               <a:rPr lang="en-US" smtClean="0"/>
-              <a:t>7/20/2022</a:t>
+              <a:t>7/21/2022</a:t>
             </a:fld>
             <a:endParaRPr lang="en-US"/>
           </a:p>
@@ -1731,7 +1731,7 @@
           <a:p>
             <a:fld id="{208FA2B7-0B11-4137-BC5E-6BB985399255}" type="datetimeFigureOut">
               <a:rPr lang="en-US" smtClean="0"/>
-              <a:t>7/20/2022</a:t>
+              <a:t>7/21/2022</a:t>
             </a:fld>
             <a:endParaRPr lang="en-US"/>
           </a:p>
@@ -2098,7 +2098,7 @@
           <a:p>
             <a:fld id="{208FA2B7-0B11-4137-BC5E-6BB985399255}" type="datetimeFigureOut">
               <a:rPr lang="en-US" smtClean="0"/>
-              <a:t>7/20/2022</a:t>
+              <a:t>7/21/2022</a:t>
             </a:fld>
             <a:endParaRPr lang="en-US"/>
           </a:p>
@@ -2216,7 +2216,7 @@
           <a:p>
             <a:fld id="{208FA2B7-0B11-4137-BC5E-6BB985399255}" type="datetimeFigureOut">
               <a:rPr lang="en-US" smtClean="0"/>
-              <a:t>7/20/2022</a:t>
+              <a:t>7/21/2022</a:t>
             </a:fld>
             <a:endParaRPr lang="en-US"/>
           </a:p>
@@ -2311,7 +2311,7 @@
           <a:p>
             <a:fld id="{208FA2B7-0B11-4137-BC5E-6BB985399255}" type="datetimeFigureOut">
               <a:rPr lang="en-US" smtClean="0"/>
-              <a:t>7/20/2022</a:t>
+              <a:t>7/21/2022</a:t>
             </a:fld>
             <a:endParaRPr lang="en-US"/>
           </a:p>
@@ -2588,7 +2588,7 @@
           <a:p>
             <a:fld id="{208FA2B7-0B11-4137-BC5E-6BB985399255}" type="datetimeFigureOut">
               <a:rPr lang="en-US" smtClean="0"/>
-              <a:t>7/20/2022</a:t>
+              <a:t>7/21/2022</a:t>
             </a:fld>
             <a:endParaRPr lang="en-US"/>
           </a:p>
@@ -2841,7 +2841,7 @@
           <a:p>
             <a:fld id="{208FA2B7-0B11-4137-BC5E-6BB985399255}" type="datetimeFigureOut">
               <a:rPr lang="en-US" smtClean="0"/>
-              <a:t>7/20/2022</a:t>
+              <a:t>7/21/2022</a:t>
             </a:fld>
             <a:endParaRPr lang="en-US"/>
           </a:p>
@@ -3054,7 +3054,7 @@
           <a:p>
             <a:fld id="{208FA2B7-0B11-4137-BC5E-6BB985399255}" type="datetimeFigureOut">
               <a:rPr lang="en-US" smtClean="0"/>
-              <a:t>7/20/2022</a:t>
+              <a:t>7/21/2022</a:t>
             </a:fld>
             <a:endParaRPr lang="en-US"/>
           </a:p>
@@ -3493,10 +3493,15 @@
             <p:ph type="subTitle" idx="1"/>
           </p:nvPr>
         </p:nvSpPr>
-        <p:spPr/>
+        <p:spPr>
+          <a:xfrm>
+            <a:off x="0" y="3602038"/>
+            <a:ext cx="11853644" cy="1655762"/>
+          </a:xfrm>
+        </p:spPr>
         <p:txBody>
           <a:bodyPr>
-            <a:normAutofit/>
+            <a:normAutofit fontScale="92500"/>
           </a:bodyPr>
           <a:lstStyle/>
           <a:p>
@@ -3509,6 +3514,14 @@
             </a:br>
             <a:r>
               <a:rPr lang="en-US" sz="3600" dirty="0" smtClean="0"/>
+              <a:t>Ahmed Samir Abd El </a:t>
+            </a:r>
+            <a:r>
+              <a:rPr lang="en-US" sz="3600" dirty="0" err="1" smtClean="0"/>
+              <a:t>Aal</a:t>
+            </a:r>
+            <a:r>
+              <a:rPr lang="en-US" sz="3600" dirty="0" smtClean="0"/>
               <a:t/>
             </a:r>
             <a:br>
@@ -3516,11 +3529,19 @@
             </a:br>
             <a:r>
               <a:rPr lang="en-US" sz="3600" dirty="0" smtClean="0"/>
-              <a:t>Ahmed Samir Abd El </a:t>
+              <a:t>Tutorial </a:t>
             </a:r>
             <a:r>
               <a:rPr lang="en-US" sz="3600" dirty="0" err="1" smtClean="0"/>
-              <a:t>Aal</a:t>
+              <a:t>github</a:t>
+            </a:r>
+            <a:r>
+              <a:rPr lang="en-US" sz="3600" smtClean="0"/>
+              <a:t>: https</a:t>
+            </a:r>
+            <a:r>
+              <a:rPr lang="en-US" sz="3600" dirty="0"/>
+              <a:t>://github.com/ahmedsure/sure_tut_gql.git</a:t>
             </a:r>
             <a:endParaRPr lang="en-US" sz="3600" dirty="0"/>
           </a:p>

</xml_diff>